<commit_message>
Updated presentation to discuss licenses.
</commit_message>
<xml_diff>
--- a/Design/BloomOverview.pptx
+++ b/Design/BloomOverview.pptx
@@ -6,10 +6,10 @@
     <p:sldMasterId id="2147483708" r:id="rId2"/>
   </p:sldMasterIdLst>
   <p:notesMasterIdLst>
-    <p:notesMasterId r:id="rId38"/>
+    <p:notesMasterId r:id="rId39"/>
   </p:notesMasterIdLst>
   <p:handoutMasterIdLst>
-    <p:handoutMasterId r:id="rId39"/>
+    <p:handoutMasterId r:id="rId40"/>
   </p:handoutMasterIdLst>
   <p:sldIdLst>
     <p:sldId id="279" r:id="rId3"/>
@@ -44,9 +44,10 @@
     <p:sldId id="271" r:id="rId32"/>
     <p:sldId id="272" r:id="rId33"/>
     <p:sldId id="273" r:id="rId34"/>
-    <p:sldId id="274" r:id="rId35"/>
-    <p:sldId id="289" r:id="rId36"/>
-    <p:sldId id="297" r:id="rId37"/>
+    <p:sldId id="298" r:id="rId35"/>
+    <p:sldId id="274" r:id="rId36"/>
+    <p:sldId id="289" r:id="rId37"/>
+    <p:sldId id="297" r:id="rId38"/>
   </p:sldIdLst>
   <p:sldSz cx="10080625" cy="7559675"/>
   <p:notesSz cx="7772400" cy="10058400"/>
@@ -3147,7 +3148,7 @@
             <a:fld id="{F4BE94FE-0590-477B-80AF-AB5621389EFE}" type="datetimeFigureOut">
               <a:rPr lang="en-US" smtClean="0"/>
               <a:pPr/>
-              <a:t>5/5/2010</a:t>
+              <a:t>5/11/2010</a:t>
             </a:fld>
             <a:endParaRPr lang="en-US"/>
           </a:p>
@@ -3314,7 +3315,7 @@
             <a:fld id="{F4BE94FE-0590-477B-80AF-AB5621389EFE}" type="datetimeFigureOut">
               <a:rPr lang="en-US" smtClean="0"/>
               <a:pPr/>
-              <a:t>5/5/2010</a:t>
+              <a:t>5/11/2010</a:t>
             </a:fld>
             <a:endParaRPr lang="en-US"/>
           </a:p>
@@ -3491,7 +3492,7 @@
             <a:fld id="{F4BE94FE-0590-477B-80AF-AB5621389EFE}" type="datetimeFigureOut">
               <a:rPr lang="en-US" smtClean="0"/>
               <a:pPr/>
-              <a:t>5/5/2010</a:t>
+              <a:t>5/11/2010</a:t>
             </a:fld>
             <a:endParaRPr lang="en-US"/>
           </a:p>
@@ -3730,7 +3731,7 @@
             <a:fld id="{F4BE94FE-0590-477B-80AF-AB5621389EFE}" type="datetimeFigureOut">
               <a:rPr lang="en-US" smtClean="0"/>
               <a:pPr/>
-              <a:t>5/5/2010</a:t>
+              <a:t>5/11/2010</a:t>
             </a:fld>
             <a:endParaRPr lang="en-US"/>
           </a:p>
@@ -3874,7 +3875,7 @@
             <a:fld id="{F4BE94FE-0590-477B-80AF-AB5621389EFE}" type="datetimeFigureOut">
               <a:rPr lang="en-US" smtClean="0"/>
               <a:pPr/>
-              <a:t>5/5/2010</a:t>
+              <a:t>5/11/2010</a:t>
             </a:fld>
             <a:endParaRPr lang="en-US"/>
           </a:p>
@@ -4117,7 +4118,7 @@
             <a:fld id="{F4BE94FE-0590-477B-80AF-AB5621389EFE}" type="datetimeFigureOut">
               <a:rPr lang="en-US" smtClean="0"/>
               <a:pPr/>
-              <a:t>5/5/2010</a:t>
+              <a:t>5/11/2010</a:t>
             </a:fld>
             <a:endParaRPr lang="en-US"/>
           </a:p>
@@ -4402,7 +4403,7 @@
             <a:fld id="{F4BE94FE-0590-477B-80AF-AB5621389EFE}" type="datetimeFigureOut">
               <a:rPr lang="en-US" smtClean="0"/>
               <a:pPr/>
-              <a:t>5/5/2010</a:t>
+              <a:t>5/11/2010</a:t>
             </a:fld>
             <a:endParaRPr lang="en-US"/>
           </a:p>
@@ -4821,7 +4822,7 @@
             <a:fld id="{F4BE94FE-0590-477B-80AF-AB5621389EFE}" type="datetimeFigureOut">
               <a:rPr lang="en-US" smtClean="0"/>
               <a:pPr/>
-              <a:t>5/5/2010</a:t>
+              <a:t>5/11/2010</a:t>
             </a:fld>
             <a:endParaRPr lang="en-US"/>
           </a:p>
@@ -4936,7 +4937,7 @@
             <a:fld id="{F4BE94FE-0590-477B-80AF-AB5621389EFE}" type="datetimeFigureOut">
               <a:rPr lang="en-US" smtClean="0"/>
               <a:pPr/>
-              <a:t>5/5/2010</a:t>
+              <a:t>5/11/2010</a:t>
             </a:fld>
             <a:endParaRPr lang="en-US"/>
           </a:p>
@@ -5028,7 +5029,7 @@
             <a:fld id="{F4BE94FE-0590-477B-80AF-AB5621389EFE}" type="datetimeFigureOut">
               <a:rPr lang="en-US" smtClean="0"/>
               <a:pPr/>
-              <a:t>5/5/2010</a:t>
+              <a:t>5/11/2010</a:t>
             </a:fld>
             <a:endParaRPr lang="en-US"/>
           </a:p>
@@ -5302,7 +5303,7 @@
             <a:fld id="{F4BE94FE-0590-477B-80AF-AB5621389EFE}" type="datetimeFigureOut">
               <a:rPr lang="en-US" smtClean="0"/>
               <a:pPr/>
-              <a:t>5/5/2010</a:t>
+              <a:t>5/11/2010</a:t>
             </a:fld>
             <a:endParaRPr lang="en-US"/>
           </a:p>
@@ -5446,7 +5447,7 @@
             <a:fld id="{F4BE94FE-0590-477B-80AF-AB5621389EFE}" type="datetimeFigureOut">
               <a:rPr lang="en-US" smtClean="0"/>
               <a:pPr/>
-              <a:t>5/5/2010</a:t>
+              <a:t>5/11/2010</a:t>
             </a:fld>
             <a:endParaRPr lang="en-US"/>
           </a:p>
@@ -5696,7 +5697,7 @@
             <a:fld id="{F4BE94FE-0590-477B-80AF-AB5621389EFE}" type="datetimeFigureOut">
               <a:rPr lang="en-US" smtClean="0"/>
               <a:pPr/>
-              <a:t>5/5/2010</a:t>
+              <a:t>5/11/2010</a:t>
             </a:fld>
             <a:endParaRPr lang="en-US"/>
           </a:p>
@@ -5863,7 +5864,7 @@
             <a:fld id="{F4BE94FE-0590-477B-80AF-AB5621389EFE}" type="datetimeFigureOut">
               <a:rPr lang="en-US" smtClean="0"/>
               <a:pPr/>
-              <a:t>5/5/2010</a:t>
+              <a:t>5/11/2010</a:t>
             </a:fld>
             <a:endParaRPr lang="en-US"/>
           </a:p>
@@ -6040,7 +6041,7 @@
             <a:fld id="{F4BE94FE-0590-477B-80AF-AB5621389EFE}" type="datetimeFigureOut">
               <a:rPr lang="en-US" smtClean="0"/>
               <a:pPr/>
-              <a:t>5/5/2010</a:t>
+              <a:t>5/11/2010</a:t>
             </a:fld>
             <a:endParaRPr lang="en-US"/>
           </a:p>
@@ -6283,7 +6284,7 @@
             <a:fld id="{F4BE94FE-0590-477B-80AF-AB5621389EFE}" type="datetimeFigureOut">
               <a:rPr lang="en-US" smtClean="0"/>
               <a:pPr/>
-              <a:t>5/5/2010</a:t>
+              <a:t>5/11/2010</a:t>
             </a:fld>
             <a:endParaRPr lang="en-US"/>
           </a:p>
@@ -6568,7 +6569,7 @@
             <a:fld id="{F4BE94FE-0590-477B-80AF-AB5621389EFE}" type="datetimeFigureOut">
               <a:rPr lang="en-US" smtClean="0"/>
               <a:pPr/>
-              <a:t>5/5/2010</a:t>
+              <a:t>5/11/2010</a:t>
             </a:fld>
             <a:endParaRPr lang="en-US"/>
           </a:p>
@@ -6987,7 +6988,7 @@
             <a:fld id="{F4BE94FE-0590-477B-80AF-AB5621389EFE}" type="datetimeFigureOut">
               <a:rPr lang="en-US" smtClean="0"/>
               <a:pPr/>
-              <a:t>5/5/2010</a:t>
+              <a:t>5/11/2010</a:t>
             </a:fld>
             <a:endParaRPr lang="en-US"/>
           </a:p>
@@ -7102,7 +7103,7 @@
             <a:fld id="{F4BE94FE-0590-477B-80AF-AB5621389EFE}" type="datetimeFigureOut">
               <a:rPr lang="en-US" smtClean="0"/>
               <a:pPr/>
-              <a:t>5/5/2010</a:t>
+              <a:t>5/11/2010</a:t>
             </a:fld>
             <a:endParaRPr lang="en-US"/>
           </a:p>
@@ -7194,7 +7195,7 @@
             <a:fld id="{F4BE94FE-0590-477B-80AF-AB5621389EFE}" type="datetimeFigureOut">
               <a:rPr lang="en-US" smtClean="0"/>
               <a:pPr/>
-              <a:t>5/5/2010</a:t>
+              <a:t>5/11/2010</a:t>
             </a:fld>
             <a:endParaRPr lang="en-US"/>
           </a:p>
@@ -7468,7 +7469,7 @@
             <a:fld id="{F4BE94FE-0590-477B-80AF-AB5621389EFE}" type="datetimeFigureOut">
               <a:rPr lang="en-US" smtClean="0"/>
               <a:pPr/>
-              <a:t>5/5/2010</a:t>
+              <a:t>5/11/2010</a:t>
             </a:fld>
             <a:endParaRPr lang="en-US"/>
           </a:p>
@@ -7718,7 +7719,7 @@
             <a:fld id="{F4BE94FE-0590-477B-80AF-AB5621389EFE}" type="datetimeFigureOut">
               <a:rPr lang="en-US" smtClean="0"/>
               <a:pPr/>
-              <a:t>5/5/2010</a:t>
+              <a:t>5/11/2010</a:t>
             </a:fld>
             <a:endParaRPr lang="en-US"/>
           </a:p>
@@ -7981,7 +7982,7 @@
             <a:fld id="{F4BE94FE-0590-477B-80AF-AB5621389EFE}" type="datetimeFigureOut">
               <a:rPr lang="en-US" smtClean="0"/>
               <a:pPr/>
-              <a:t>5/5/2010</a:t>
+              <a:t>5/11/2010</a:t>
             </a:fld>
             <a:endParaRPr lang="en-US"/>
           </a:p>
@@ -8515,7 +8516,7 @@
             <a:fld id="{F4BE94FE-0590-477B-80AF-AB5621389EFE}" type="datetimeFigureOut">
               <a:rPr lang="en-US" smtClean="0"/>
               <a:pPr/>
-              <a:t>5/5/2010</a:t>
+              <a:t>5/11/2010</a:t>
             </a:fld>
             <a:endParaRPr lang="en-US"/>
           </a:p>
@@ -9042,7 +9043,7 @@
             <a:fld id="{19615034-2B20-4FB6-B104-E640F6FEAD8E}" type="datetime1">
               <a:rPr lang="en-US" sz="2000" smtClean="0"/>
               <a:pPr/>
-              <a:t>5/5/2010</a:t>
+              <a:t>5/11/2010</a:t>
             </a:fld>
             <a:endParaRPr lang="en-US" dirty="0"/>
           </a:p>
@@ -13606,6 +13607,175 @@
 
 <file path=ppt/slides/slide33.xml><?xml version="1.0" encoding="utf-8"?>
 <p:sld xmlns:a="http://schemas.openxmlformats.org/drawingml/2006/main" xmlns:r="http://schemas.openxmlformats.org/officeDocument/2006/relationships" xmlns:p="http://schemas.openxmlformats.org/presentationml/2006/main">
+  <p:cSld>
+    <p:spTree>
+      <p:nvGrpSpPr>
+        <p:cNvPr id="1" name=""/>
+        <p:cNvGrpSpPr/>
+        <p:nvPr/>
+      </p:nvGrpSpPr>
+      <p:grpSpPr>
+        <a:xfrm>
+          <a:off x="0" y="0"/>
+          <a:ext cx="0" cy="0"/>
+          <a:chOff x="0" y="0"/>
+          <a:chExt cx="0" cy="0"/>
+        </a:xfrm>
+      </p:grpSpPr>
+      <p:sp>
+        <p:nvSpPr>
+          <p:cNvPr id="2" name="Title 1"/>
+          <p:cNvSpPr>
+            <a:spLocks noGrp="1"/>
+          </p:cNvSpPr>
+          <p:nvPr>
+            <p:ph type="title"/>
+          </p:nvPr>
+        </p:nvSpPr>
+        <p:spPr/>
+        <p:txBody>
+          <a:bodyPr/>
+          <a:lstStyle/>
+          <a:p>
+            <a:r>
+              <a:rPr lang="en-US" dirty="0" smtClean="0"/>
+              <a:t>Licenses</a:t>
+            </a:r>
+            <a:endParaRPr lang="en-US" dirty="0"/>
+          </a:p>
+        </p:txBody>
+      </p:sp>
+      <p:sp>
+        <p:nvSpPr>
+          <p:cNvPr id="3" name="Content Placeholder 2"/>
+          <p:cNvSpPr>
+            <a:spLocks noGrp="1"/>
+          </p:cNvSpPr>
+          <p:nvPr>
+            <p:ph idx="1"/>
+          </p:nvPr>
+        </p:nvSpPr>
+        <p:spPr>
+          <a:xfrm>
+            <a:off x="1230312" y="1417637"/>
+            <a:ext cx="8347076" cy="5335588"/>
+          </a:xfrm>
+        </p:spPr>
+        <p:txBody>
+          <a:bodyPr>
+            <a:normAutofit fontScale="55000" lnSpcReduction="20000"/>
+          </a:bodyPr>
+          <a:lstStyle/>
+          <a:p>
+            <a:r>
+              <a:rPr lang="en-US" dirty="0" smtClean="0"/>
+              <a:t>In PNG we are promoting shift in attention away from simple “Copyright” with an “all rights reserved” message, to an explicit license which applies to everyone.  That is, the copyright is still there, but the copyright holder(s) agree to offer the content for reuse under specified conditions, as in “some rights reserved”. For example, they might agree that derivative works can be made, but only non-commercially, and only if the derivative works still gives them credit.</a:t>
+            </a:r>
+          </a:p>
+          <a:p>
+            <a:r>
+              <a:rPr lang="en-US" dirty="0" smtClean="0"/>
+              <a:t>It is the absence of such licenses which is currently giving many of us so much grief, as we simply seek to get native-authored materials “out there” where they can do the good the authors intended for them to do.</a:t>
+            </a:r>
+          </a:p>
+          <a:p>
+            <a:r>
+              <a:rPr lang="en-US" dirty="0" smtClean="0"/>
+              <a:t>Bloom joins a growing body of software in being license-savvy.  This has two parts:</a:t>
+            </a:r>
+          </a:p>
+          <a:p>
+            <a:pPr marL="514350" indent="-514350">
+              <a:buAutoNum type="arabicParenR"/>
+            </a:pPr>
+            <a:r>
+              <a:rPr lang="en-US" dirty="0" smtClean="0"/>
+              <a:t>Bloom will require that the user indicate the license that the material is published under, and will embed that license in the document itself an using industry-standard format (</a:t>
+            </a:r>
+            <a:r>
+              <a:rPr lang="en-US" dirty="0" smtClean="0">
+                <a:hlinkClick r:id="rId2"/>
+              </a:rPr>
+              <a:t>XMP</a:t>
+            </a:r>
+            <a:r>
+              <a:rPr lang="en-US" dirty="0" smtClean="0"/>
+              <a:t>).  This includes individual illustrations, which may each have their own license.</a:t>
+            </a:r>
+          </a:p>
+          <a:p>
+            <a:pPr marL="514350" indent="-514350">
+              <a:buAutoNum type="arabicParenR"/>
+            </a:pPr>
+            <a:r>
+              <a:rPr lang="en-US" dirty="0" smtClean="0"/>
+              <a:t>If/when Bloom supports </a:t>
+            </a:r>
+            <a:r>
+              <a:rPr lang="en-US" dirty="0" err="1" smtClean="0"/>
+              <a:t>shellbooks</a:t>
+            </a:r>
+            <a:r>
+              <a:rPr lang="en-US" dirty="0" smtClean="0"/>
+              <a:t>, it will help to enforce the terms of well-known licenses (like </a:t>
+            </a:r>
+            <a:r>
+              <a:rPr lang="en-US" dirty="0" smtClean="0">
+                <a:hlinkClick r:id="rId3"/>
+              </a:rPr>
+              <a:t>Creative Commons</a:t>
+            </a:r>
+            <a:r>
+              <a:rPr lang="en-US" dirty="0" smtClean="0"/>
+              <a:t>).  For example, if the license on an illustration requires attribution to the artist, Bloom could make it impossible to remove his/her name.</a:t>
+            </a:r>
+          </a:p>
+          <a:p>
+            <a:pPr indent="-514350"/>
+            <a:r>
+              <a:rPr lang="en-US" dirty="0" smtClean="0"/>
+              <a:t>What Bloom will </a:t>
+            </a:r>
+            <a:r>
+              <a:rPr lang="en-US" i="1" dirty="0" smtClean="0"/>
+              <a:t>not</a:t>
+            </a:r>
+            <a:r>
+              <a:rPr lang="en-US" dirty="0" smtClean="0"/>
+              <a:t> attempt is to foil efforts to remove the license by opening Bloom document in some text editor.  If you go to that extreme, it’s you who is breaking the law, and it’s not worth our effort to stop you.</a:t>
+            </a:r>
+            <a:endParaRPr lang="en-US" dirty="0" smtClean="0"/>
+          </a:p>
+          <a:p>
+            <a:pPr marL="514350" indent="-514350">
+              <a:buAutoNum type="arabicParenR"/>
+            </a:pPr>
+            <a:endParaRPr lang="en-US" dirty="0" smtClean="0"/>
+          </a:p>
+          <a:p>
+            <a:pPr marL="514350" indent="-514350">
+              <a:buAutoNum type="arabicParenR"/>
+            </a:pPr>
+            <a:endParaRPr lang="en-US" dirty="0" smtClean="0"/>
+          </a:p>
+          <a:p>
+            <a:pPr marL="514350" indent="-514350">
+              <a:buAutoNum type="arabicParenR"/>
+            </a:pPr>
+            <a:endParaRPr lang="en-US" dirty="0"/>
+          </a:p>
+        </p:txBody>
+      </p:sp>
+    </p:spTree>
+  </p:cSld>
+  <p:clrMapOvr>
+    <a:masterClrMapping/>
+  </p:clrMapOvr>
+</p:sld>
+</file>
+
+<file path=ppt/slides/slide34.xml><?xml version="1.0" encoding="utf-8"?>
+<p:sld xmlns:a="http://schemas.openxmlformats.org/drawingml/2006/main" xmlns:r="http://schemas.openxmlformats.org/officeDocument/2006/relationships" xmlns:p="http://schemas.openxmlformats.org/presentationml/2006/main">
   <p:cSld name="page19">
     <p:spTree>
       <p:nvGrpSpPr>
@@ -13665,167 +13835,6 @@
 </p:sld>
 </file>
 
-<file path=ppt/slides/slide34.xml><?xml version="1.0" encoding="utf-8"?>
-<p:sld xmlns:a="http://schemas.openxmlformats.org/drawingml/2006/main" xmlns:r="http://schemas.openxmlformats.org/officeDocument/2006/relationships" xmlns:p="http://schemas.openxmlformats.org/presentationml/2006/main">
-  <p:cSld>
-    <p:spTree>
-      <p:nvGrpSpPr>
-        <p:cNvPr id="1" name=""/>
-        <p:cNvGrpSpPr/>
-        <p:nvPr/>
-      </p:nvGrpSpPr>
-      <p:grpSpPr>
-        <a:xfrm>
-          <a:off x="0" y="0"/>
-          <a:ext cx="0" cy="0"/>
-          <a:chOff x="0" y="0"/>
-          <a:chExt cx="0" cy="0"/>
-        </a:xfrm>
-      </p:grpSpPr>
-      <p:sp>
-        <p:nvSpPr>
-          <p:cNvPr id="2" name="Title 1"/>
-          <p:cNvSpPr>
-            <a:spLocks noGrp="1"/>
-          </p:cNvSpPr>
-          <p:nvPr>
-            <p:ph type="title"/>
-          </p:nvPr>
-        </p:nvSpPr>
-        <p:spPr/>
-        <p:txBody>
-          <a:bodyPr/>
-          <a:lstStyle/>
-          <a:p>
-            <a:r>
-              <a:rPr lang="en-US" dirty="0" smtClean="0"/>
-              <a:t>File Formats</a:t>
-            </a:r>
-            <a:endParaRPr lang="en-US" dirty="0"/>
-          </a:p>
-        </p:txBody>
-      </p:sp>
-      <p:sp>
-        <p:nvSpPr>
-          <p:cNvPr id="3" name="Content Placeholder 2"/>
-          <p:cNvSpPr>
-            <a:spLocks noGrp="1"/>
-          </p:cNvSpPr>
-          <p:nvPr>
-            <p:ph idx="1"/>
-          </p:nvPr>
-        </p:nvSpPr>
-        <p:spPr>
-          <a:xfrm>
-            <a:off x="1230312" y="1763713"/>
-            <a:ext cx="7162800" cy="4302124"/>
-          </a:xfrm>
-        </p:spPr>
-        <p:txBody>
-          <a:bodyPr>
-            <a:normAutofit fontScale="47500" lnSpcReduction="20000"/>
-          </a:bodyPr>
-          <a:lstStyle/>
-          <a:p>
-            <a:r>
-              <a:rPr lang="en-US" dirty="0" smtClean="0"/>
-              <a:t>The initial Bloom prototype uses a subset of the same format as web pages: </a:t>
-            </a:r>
-            <a:r>
-              <a:rPr lang="en-US" dirty="0" err="1" smtClean="0"/>
-              <a:t>xhtml</a:t>
-            </a:r>
-            <a:r>
-              <a:rPr lang="en-US" dirty="0" smtClean="0"/>
-              <a:t> (XML Hypertext Markup Language) + CSS (Cascading Style Sheets).  Advantages:</a:t>
-            </a:r>
-          </a:p>
-          <a:p>
-            <a:pPr lvl="0"/>
-            <a:r>
-              <a:rPr lang="en-US" dirty="0" smtClean="0"/>
-              <a:t>Longevity</a:t>
-            </a:r>
-          </a:p>
-          <a:p>
-            <a:pPr lvl="1"/>
-            <a:r>
-              <a:rPr lang="en-US" dirty="0" smtClean="0"/>
-              <a:t>Even after Bloom goes away, you’ll always be able to open them.  </a:t>
-            </a:r>
-          </a:p>
-          <a:p>
-            <a:pPr lvl="0"/>
-            <a:r>
-              <a:rPr lang="en-US" dirty="0" smtClean="0"/>
-              <a:t>Lower development/maintenance</a:t>
-            </a:r>
-            <a:r>
-              <a:rPr lang="en-US" baseline="0" dirty="0" smtClean="0"/>
-              <a:t> </a:t>
-            </a:r>
-            <a:r>
-              <a:rPr lang="en-US" dirty="0" smtClean="0"/>
-              <a:t>costs</a:t>
-            </a:r>
-          </a:p>
-          <a:p>
-            <a:pPr lvl="1"/>
-            <a:r>
-              <a:rPr lang="en-US" dirty="0" smtClean="0"/>
-              <a:t>We can also leverage freely-available components to do screen and print rendering, without having to program and maintain all that ourselves. For example, the prototype uses </a:t>
-            </a:r>
-            <a:r>
-              <a:rPr lang="en-US" dirty="0" err="1" smtClean="0"/>
-              <a:t>FireFox’s</a:t>
-            </a:r>
-            <a:r>
-              <a:rPr lang="en-US" dirty="0" smtClean="0"/>
-              <a:t> rendering engine.</a:t>
-            </a:r>
-          </a:p>
-          <a:p>
-            <a:r>
-              <a:rPr lang="en-US" dirty="0" smtClean="0"/>
-              <a:t>Capability</a:t>
-            </a:r>
-          </a:p>
-          <a:p>
-            <a:pPr lvl="1"/>
-            <a:r>
-              <a:rPr lang="en-US" dirty="0" smtClean="0"/>
-              <a:t>Since Firefox can display Complex Non-Roman scripts, Bloom can too.  Text can wrap around images, be laid out in tables, etc.</a:t>
-            </a:r>
-          </a:p>
-          <a:p>
-            <a:r>
-              <a:rPr lang="en-US" dirty="0" smtClean="0"/>
-              <a:t>Other Tools</a:t>
-            </a:r>
-          </a:p>
-          <a:p>
-            <a:pPr lvl="1"/>
-            <a:r>
-              <a:rPr lang="en-US" dirty="0" smtClean="0"/>
-              <a:t>Using these open standards also means that a technician (not the target audience) may be able to use other tools, such as those from Adobe, to create content for Bloom as well as tweak Bloom-created books for final printing, when necessary.</a:t>
-            </a:r>
-          </a:p>
-          <a:p>
-            <a:endParaRPr lang="en-US" dirty="0" smtClean="0"/>
-          </a:p>
-          <a:p>
-            <a:endParaRPr lang="en-US" dirty="0" smtClean="0"/>
-          </a:p>
-        </p:txBody>
-      </p:sp>
-    </p:spTree>
-  </p:cSld>
-  <p:clrMapOvr>
-    <a:masterClrMapping/>
-  </p:clrMapOvr>
-</p:sld>
-</file>
-
 <file path=ppt/slides/slide35.xml><?xml version="1.0" encoding="utf-8"?>
 <p:sld xmlns:a="http://schemas.openxmlformats.org/drawingml/2006/main" xmlns:r="http://schemas.openxmlformats.org/officeDocument/2006/relationships" xmlns:p="http://schemas.openxmlformats.org/presentationml/2006/main">
   <p:cSld>
@@ -13860,6 +13869,167 @@
           <a:p>
             <a:r>
               <a:rPr lang="en-US" dirty="0" smtClean="0"/>
+              <a:t>File Formats</a:t>
+            </a:r>
+            <a:endParaRPr lang="en-US" dirty="0"/>
+          </a:p>
+        </p:txBody>
+      </p:sp>
+      <p:sp>
+        <p:nvSpPr>
+          <p:cNvPr id="3" name="Content Placeholder 2"/>
+          <p:cNvSpPr>
+            <a:spLocks noGrp="1"/>
+          </p:cNvSpPr>
+          <p:nvPr>
+            <p:ph idx="1"/>
+          </p:nvPr>
+        </p:nvSpPr>
+        <p:spPr>
+          <a:xfrm>
+            <a:off x="1230312" y="1763713"/>
+            <a:ext cx="7162800" cy="4302124"/>
+          </a:xfrm>
+        </p:spPr>
+        <p:txBody>
+          <a:bodyPr>
+            <a:normAutofit fontScale="47500" lnSpcReduction="20000"/>
+          </a:bodyPr>
+          <a:lstStyle/>
+          <a:p>
+            <a:r>
+              <a:rPr lang="en-US" dirty="0" smtClean="0"/>
+              <a:t>The initial Bloom prototype uses a subset of the same format as web pages: </a:t>
+            </a:r>
+            <a:r>
+              <a:rPr lang="en-US" dirty="0" err="1" smtClean="0"/>
+              <a:t>xhtml</a:t>
+            </a:r>
+            <a:r>
+              <a:rPr lang="en-US" dirty="0" smtClean="0"/>
+              <a:t> (XML Hypertext Markup Language) + CSS (Cascading Style Sheets).  Advantages:</a:t>
+            </a:r>
+          </a:p>
+          <a:p>
+            <a:pPr lvl="0"/>
+            <a:r>
+              <a:rPr lang="en-US" dirty="0" smtClean="0"/>
+              <a:t>Longevity</a:t>
+            </a:r>
+          </a:p>
+          <a:p>
+            <a:pPr lvl="1"/>
+            <a:r>
+              <a:rPr lang="en-US" dirty="0" smtClean="0"/>
+              <a:t>Even after Bloom goes away, you’ll always be able to open them.  </a:t>
+            </a:r>
+          </a:p>
+          <a:p>
+            <a:pPr lvl="0"/>
+            <a:r>
+              <a:rPr lang="en-US" dirty="0" smtClean="0"/>
+              <a:t>Lower development/maintenance</a:t>
+            </a:r>
+            <a:r>
+              <a:rPr lang="en-US" baseline="0" dirty="0" smtClean="0"/>
+              <a:t> </a:t>
+            </a:r>
+            <a:r>
+              <a:rPr lang="en-US" dirty="0" smtClean="0"/>
+              <a:t>costs</a:t>
+            </a:r>
+          </a:p>
+          <a:p>
+            <a:pPr lvl="1"/>
+            <a:r>
+              <a:rPr lang="en-US" dirty="0" smtClean="0"/>
+              <a:t>We can also leverage freely-available components to do screen and print rendering, without having to program and maintain all that ourselves. For example, the prototype uses </a:t>
+            </a:r>
+            <a:r>
+              <a:rPr lang="en-US" dirty="0" err="1" smtClean="0"/>
+              <a:t>FireFox’s</a:t>
+            </a:r>
+            <a:r>
+              <a:rPr lang="en-US" dirty="0" smtClean="0"/>
+              <a:t> rendering engine.</a:t>
+            </a:r>
+          </a:p>
+          <a:p>
+            <a:r>
+              <a:rPr lang="en-US" dirty="0" smtClean="0"/>
+              <a:t>Capability</a:t>
+            </a:r>
+          </a:p>
+          <a:p>
+            <a:pPr lvl="1"/>
+            <a:r>
+              <a:rPr lang="en-US" dirty="0" smtClean="0"/>
+              <a:t>Since Firefox can display Complex Non-Roman scripts, Bloom can too.  Text can wrap around images, be laid out in tables, etc.</a:t>
+            </a:r>
+          </a:p>
+          <a:p>
+            <a:r>
+              <a:rPr lang="en-US" dirty="0" smtClean="0"/>
+              <a:t>Other Tools</a:t>
+            </a:r>
+          </a:p>
+          <a:p>
+            <a:pPr lvl="1"/>
+            <a:r>
+              <a:rPr lang="en-US" dirty="0" smtClean="0"/>
+              <a:t>Using these open standards also means that a technician (not the target audience) may be able to use other tools, such as those from Adobe, to create content for Bloom as well as tweak Bloom-created books for final printing, when necessary.</a:t>
+            </a:r>
+          </a:p>
+          <a:p>
+            <a:endParaRPr lang="en-US" dirty="0" smtClean="0"/>
+          </a:p>
+          <a:p>
+            <a:endParaRPr lang="en-US" dirty="0" smtClean="0"/>
+          </a:p>
+        </p:txBody>
+      </p:sp>
+    </p:spTree>
+  </p:cSld>
+  <p:clrMapOvr>
+    <a:masterClrMapping/>
+  </p:clrMapOvr>
+</p:sld>
+</file>
+
+<file path=ppt/slides/slide36.xml><?xml version="1.0" encoding="utf-8"?>
+<p:sld xmlns:a="http://schemas.openxmlformats.org/drawingml/2006/main" xmlns:r="http://schemas.openxmlformats.org/officeDocument/2006/relationships" xmlns:p="http://schemas.openxmlformats.org/presentationml/2006/main">
+  <p:cSld>
+    <p:spTree>
+      <p:nvGrpSpPr>
+        <p:cNvPr id="1" name=""/>
+        <p:cNvGrpSpPr/>
+        <p:nvPr/>
+      </p:nvGrpSpPr>
+      <p:grpSpPr>
+        <a:xfrm>
+          <a:off x="0" y="0"/>
+          <a:ext cx="0" cy="0"/>
+          <a:chOff x="0" y="0"/>
+          <a:chExt cx="0" cy="0"/>
+        </a:xfrm>
+      </p:grpSpPr>
+      <p:sp>
+        <p:nvSpPr>
+          <p:cNvPr id="2" name="Title 1"/>
+          <p:cNvSpPr>
+            <a:spLocks noGrp="1"/>
+          </p:cNvSpPr>
+          <p:nvPr>
+            <p:ph type="title"/>
+          </p:nvPr>
+        </p:nvSpPr>
+        <p:spPr/>
+        <p:txBody>
+          <a:bodyPr/>
+          <a:lstStyle/>
+          <a:p>
+            <a:r>
+              <a:rPr lang="en-US" dirty="0" smtClean="0"/>
               <a:t>Format conversion</a:t>
             </a:r>
             <a:endParaRPr lang="en-US" dirty="0"/>
@@ -13915,29 +14085,8 @@
             </a:r>
             <a:r>
               <a:rPr lang="en-US" dirty="0" smtClean="0"/>
-              <a:t> lies in-between, because </a:t>
-            </a:r>
-            <a:r>
-              <a:rPr lang="en-US" dirty="0" smtClean="0"/>
-              <a:t>in order to help the user as much as it </a:t>
-            </a:r>
-            <a:r>
-              <a:rPr lang="en-US" dirty="0" smtClean="0"/>
-              <a:t>does, it will </a:t>
-            </a:r>
-            <a:r>
-              <a:rPr lang="en-US" dirty="0" smtClean="0"/>
-              <a:t>have to require the html to be laid out in particular </a:t>
-            </a:r>
-            <a:r>
-              <a:rPr lang="en-US" dirty="0" smtClean="0"/>
-              <a:t>ways</a:t>
-            </a:r>
-            <a:r>
-              <a:rPr lang="en-US" dirty="0" smtClean="0"/>
-              <a:t>:</a:t>
-            </a:r>
-            <a:endParaRPr lang="en-US" dirty="0" smtClean="0"/>
+              <a:t> lies in-between, because in order to help the user as much as it does, it will have to require the html to be laid out in particular ways:</a:t>
+            </a:r>
           </a:p>
           <a:p>
             <a:r>
@@ -13993,19 +14142,7 @@
             </a:pPr>
             <a:r>
               <a:rPr lang="en-US" dirty="0" smtClean="0"/>
-              <a:t>We should not expect </a:t>
-            </a:r>
-            <a:r>
-              <a:rPr lang="en-US" dirty="0" smtClean="0"/>
-              <a:t>to open </a:t>
-            </a:r>
-            <a:r>
-              <a:rPr lang="en-US" dirty="0" smtClean="0"/>
-              <a:t>an existing complicated </a:t>
-            </a:r>
-            <a:r>
-              <a:rPr lang="en-US" dirty="0" smtClean="0"/>
-              <a:t>document in, say, Publisher or </a:t>
+              <a:t>We should not expect to open an existing complicated document in, say, Publisher or </a:t>
             </a:r>
             <a:r>
               <a:rPr lang="en-US" dirty="0" err="1" smtClean="0"/>
@@ -14013,19 +14150,7 @@
             </a:r>
             <a:r>
               <a:rPr lang="en-US" dirty="0" smtClean="0"/>
-              <a:t>, choose “save as html” and </a:t>
-            </a:r>
-            <a:r>
-              <a:rPr lang="en-US" dirty="0" smtClean="0"/>
-              <a:t>have </a:t>
-            </a:r>
-            <a:r>
-              <a:rPr lang="en-US" dirty="0" smtClean="0"/>
-              <a:t>a Bloom-compatible book.  </a:t>
-            </a:r>
-            <a:r>
-              <a:rPr lang="en-US" dirty="0" smtClean="0"/>
-              <a:t>It’s likely that creating Bloom templates/shells would require a technician who can handle actual html and </a:t>
+              <a:t>, choose “save as html” and have a Bloom-compatible book.  It’s likely that creating Bloom templates/shells would require a technician who can handle actual html and </a:t>
             </a:r>
             <a:r>
               <a:rPr lang="en-US" dirty="0" err="1" smtClean="0"/>
@@ -14035,7 +14160,6 @@
               <a:rPr lang="en-US" dirty="0" smtClean="0"/>
               <a:t> markup; the skill level should be less than that required, say, for Bible typesetting.</a:t>
             </a:r>
-            <a:endParaRPr lang="en-US" dirty="0" smtClean="0"/>
           </a:p>
           <a:p>
             <a:pPr>

</xml_diff>